<commit_message>
Pequeños cambios en la presentación
</commit_message>
<xml_diff>
--- a/zombiesppt.pptx
+++ b/zombiesppt.pptx
@@ -405,7 +405,7 @@
             <a:fld id="{BD3AD817-10B2-41E6-93DF-32BB2CD4AA9E}" type="datetimeFigureOut">
               <a:rPr lang="es-ES" smtClean="0"/>
               <a:pPr/>
-              <a:t>24/05/2014</a:t>
+              <a:t>25/05/14</a:t>
             </a:fld>
             <a:endParaRPr lang="es-ES"/>
           </a:p>
@@ -429,7 +429,7 @@
             <a:fld id="{41129089-902B-4826-A5A2-7EE54EC08807}" type="slidenum">
               <a:rPr lang="es-ES" smtClean="0"/>
               <a:pPr/>
-              <a:t>‹Nº›</a:t>
+              <a:t>‹Nr.›</a:t>
             </a:fld>
             <a:endParaRPr lang="es-ES"/>
           </a:p>
@@ -572,7 +572,7 @@
             <a:fld id="{BD3AD817-10B2-41E6-93DF-32BB2CD4AA9E}" type="datetimeFigureOut">
               <a:rPr lang="es-ES" smtClean="0"/>
               <a:pPr/>
-              <a:t>24/05/2014</a:t>
+              <a:t>25/05/14</a:t>
             </a:fld>
             <a:endParaRPr lang="es-ES"/>
           </a:p>
@@ -615,7 +615,7 @@
             <a:fld id="{41129089-902B-4826-A5A2-7EE54EC08807}" type="slidenum">
               <a:rPr lang="es-ES" smtClean="0"/>
               <a:pPr/>
-              <a:t>‹Nº›</a:t>
+              <a:t>‹Nr.›</a:t>
             </a:fld>
             <a:endParaRPr lang="es-ES"/>
           </a:p>
@@ -749,7 +749,7 @@
             <a:fld id="{BD3AD817-10B2-41E6-93DF-32BB2CD4AA9E}" type="datetimeFigureOut">
               <a:rPr lang="es-ES" smtClean="0"/>
               <a:pPr/>
-              <a:t>24/05/2014</a:t>
+              <a:t>25/05/14</a:t>
             </a:fld>
             <a:endParaRPr lang="es-ES"/>
           </a:p>
@@ -792,7 +792,7 @@
             <a:fld id="{41129089-902B-4826-A5A2-7EE54EC08807}" type="slidenum">
               <a:rPr lang="es-ES" smtClean="0"/>
               <a:pPr/>
-              <a:t>‹Nº›</a:t>
+              <a:t>‹Nr.›</a:t>
             </a:fld>
             <a:endParaRPr lang="es-ES"/>
           </a:p>
@@ -898,7 +898,7 @@
             <a:fld id="{BD3AD817-10B2-41E6-93DF-32BB2CD4AA9E}" type="datetimeFigureOut">
               <a:rPr lang="es-ES" smtClean="0"/>
               <a:pPr/>
-              <a:t>24/05/2014</a:t>
+              <a:t>25/05/14</a:t>
             </a:fld>
             <a:endParaRPr lang="es-ES"/>
           </a:p>
@@ -926,7 +926,7 @@
             <a:fld id="{41129089-902B-4826-A5A2-7EE54EC08807}" type="slidenum">
               <a:rPr lang="es-ES" smtClean="0"/>
               <a:pPr/>
-              <a:t>‹Nº›</a:t>
+              <a:t>‹Nr.›</a:t>
             </a:fld>
             <a:endParaRPr lang="es-ES"/>
           </a:p>
@@ -1017,7 +1017,7 @@
             <a:fld id="{BD3AD817-10B2-41E6-93DF-32BB2CD4AA9E}" type="datetimeFigureOut">
               <a:rPr lang="es-ES" smtClean="0"/>
               <a:pPr/>
-              <a:t>24/05/2014</a:t>
+              <a:t>25/05/14</a:t>
             </a:fld>
             <a:endParaRPr lang="es-ES"/>
           </a:p>
@@ -1060,7 +1060,7 @@
             <a:fld id="{41129089-902B-4826-A5A2-7EE54EC08807}" type="slidenum">
               <a:rPr lang="es-ES" smtClean="0"/>
               <a:pPr/>
-              <a:t>‹Nº›</a:t>
+              <a:t>‹Nr.›</a:t>
             </a:fld>
             <a:endParaRPr lang="es-ES"/>
           </a:p>
@@ -1289,7 +1289,7 @@
             <a:fld id="{BD3AD817-10B2-41E6-93DF-32BB2CD4AA9E}" type="datetimeFigureOut">
               <a:rPr lang="es-ES" smtClean="0"/>
               <a:pPr/>
-              <a:t>24/05/2014</a:t>
+              <a:t>25/05/14</a:t>
             </a:fld>
             <a:endParaRPr lang="es-ES"/>
           </a:p>
@@ -1332,7 +1332,7 @@
             <a:fld id="{41129089-902B-4826-A5A2-7EE54EC08807}" type="slidenum">
               <a:rPr lang="es-ES" smtClean="0"/>
               <a:pPr/>
-              <a:t>‹Nº›</a:t>
+              <a:t>‹Nr.›</a:t>
             </a:fld>
             <a:endParaRPr lang="es-ES"/>
           </a:p>
@@ -1518,7 +1518,7 @@
             <a:fld id="{41129089-902B-4826-A5A2-7EE54EC08807}" type="slidenum">
               <a:rPr lang="es-ES" smtClean="0"/>
               <a:pPr/>
-              <a:t>‹Nº›</a:t>
+              <a:t>‹Nr.›</a:t>
             </a:fld>
             <a:endParaRPr lang="es-ES"/>
           </a:p>
@@ -1561,7 +1561,7 @@
             <a:fld id="{BD3AD817-10B2-41E6-93DF-32BB2CD4AA9E}" type="datetimeFigureOut">
               <a:rPr lang="es-ES" smtClean="0"/>
               <a:pPr/>
-              <a:t>24/05/2014</a:t>
+              <a:t>25/05/14</a:t>
             </a:fld>
             <a:endParaRPr lang="es-ES"/>
           </a:p>
@@ -2009,7 +2009,7 @@
             <a:fld id="{BD3AD817-10B2-41E6-93DF-32BB2CD4AA9E}" type="datetimeFigureOut">
               <a:rPr lang="es-ES" smtClean="0"/>
               <a:pPr/>
-              <a:t>24/05/2014</a:t>
+              <a:t>25/05/14</a:t>
             </a:fld>
             <a:endParaRPr lang="es-ES"/>
           </a:p>
@@ -2052,7 +2052,7 @@
             <a:fld id="{41129089-902B-4826-A5A2-7EE54EC08807}" type="slidenum">
               <a:rPr lang="es-ES" smtClean="0"/>
               <a:pPr/>
-              <a:t>‹Nº›</a:t>
+              <a:t>‹Nr.›</a:t>
             </a:fld>
             <a:endParaRPr lang="es-ES"/>
           </a:p>
@@ -2124,7 +2124,7 @@
             <a:fld id="{BD3AD817-10B2-41E6-93DF-32BB2CD4AA9E}" type="datetimeFigureOut">
               <a:rPr lang="es-ES" smtClean="0"/>
               <a:pPr/>
-              <a:t>24/05/2014</a:t>
+              <a:t>25/05/14</a:t>
             </a:fld>
             <a:endParaRPr lang="es-ES"/>
           </a:p>
@@ -2167,7 +2167,7 @@
             <a:fld id="{41129089-902B-4826-A5A2-7EE54EC08807}" type="slidenum">
               <a:rPr lang="es-ES" smtClean="0"/>
               <a:pPr/>
-              <a:t>‹Nº›</a:t>
+              <a:t>‹Nr.›</a:t>
             </a:fld>
             <a:endParaRPr lang="es-ES"/>
           </a:p>
@@ -2376,7 +2376,7 @@
             <a:fld id="{BD3AD817-10B2-41E6-93DF-32BB2CD4AA9E}" type="datetimeFigureOut">
               <a:rPr lang="es-ES" smtClean="0"/>
               <a:pPr/>
-              <a:t>24/05/2014</a:t>
+              <a:t>25/05/14</a:t>
             </a:fld>
             <a:endParaRPr lang="es-ES"/>
           </a:p>
@@ -2400,7 +2400,7 @@
             <a:fld id="{41129089-902B-4826-A5A2-7EE54EC08807}" type="slidenum">
               <a:rPr lang="es-ES" smtClean="0"/>
               <a:pPr/>
-              <a:t>‹Nº›</a:t>
+              <a:t>‹Nr.›</a:t>
             </a:fld>
             <a:endParaRPr lang="es-ES"/>
           </a:p>
@@ -2618,7 +2618,7 @@
             <a:fld id="{BD3AD817-10B2-41E6-93DF-32BB2CD4AA9E}" type="datetimeFigureOut">
               <a:rPr lang="es-ES" smtClean="0"/>
               <a:pPr/>
-              <a:t>24/05/2014</a:t>
+              <a:t>25/05/14</a:t>
             </a:fld>
             <a:endParaRPr lang="es-ES"/>
           </a:p>
@@ -2642,7 +2642,7 @@
             <a:fld id="{41129089-902B-4826-A5A2-7EE54EC08807}" type="slidenum">
               <a:rPr lang="es-ES" smtClean="0"/>
               <a:pPr/>
-              <a:t>‹Nº›</a:t>
+              <a:t>‹Nr.›</a:t>
             </a:fld>
             <a:endParaRPr lang="es-ES"/>
           </a:p>
@@ -2793,7 +2793,7 @@
             <a:fld id="{BD3AD817-10B2-41E6-93DF-32BB2CD4AA9E}" type="datetimeFigureOut">
               <a:rPr lang="es-ES" smtClean="0"/>
               <a:pPr/>
-              <a:t>24/05/2014</a:t>
+              <a:t>25/05/14</a:t>
             </a:fld>
             <a:endParaRPr lang="es-ES"/>
           </a:p>
@@ -2871,7 +2871,7 @@
             <a:fld id="{41129089-902B-4826-A5A2-7EE54EC08807}" type="slidenum">
               <a:rPr lang="es-ES" smtClean="0"/>
               <a:pPr/>
-              <a:t>‹Nº›</a:t>
+              <a:t>‹Nr.›</a:t>
             </a:fld>
             <a:endParaRPr lang="es-ES"/>
           </a:p>
@@ -3300,13 +3300,21 @@
           <a:p>
             <a:r>
               <a:rPr lang="es-ES" dirty="0" smtClean="0"/>
-              <a:t>Iván Méndez Jiménez </a:t>
-            </a:r>
-          </a:p>
-          <a:p>
+              <a:t>Iván Méndez </a:t>
+            </a:r>
             <a:r>
               <a:rPr lang="es-ES" dirty="0" smtClean="0"/>
-              <a:t>		     Daniel Serrano Torres					</a:t>
+              <a:t>Jiménez</a:t>
+            </a:r>
+          </a:p>
+          <a:p>
+            <a:r>
+              <a:rPr lang="es-ES" dirty="0" smtClean="0"/>
+              <a:t>Daniel </a:t>
+            </a:r>
+            <a:r>
+              <a:rPr lang="es-ES" dirty="0" smtClean="0"/>
+              <a:t>Serrano Torres					</a:t>
             </a:r>
             <a:endParaRPr lang="es-ES" dirty="0"/>
           </a:p>
@@ -3361,11 +3369,11 @@
   <p:clrMapOvr>
     <a:masterClrMapping/>
   </p:clrMapOvr>
-  <p:transition/>
+  <p:transition xmlns:p14="http://schemas.microsoft.com/office/powerpoint/2010/main"/>
   <p:timing>
     <p:tnLst>
       <p:par>
-        <p:cTn id="1" dur="indefinite" restart="never" nodeType="tmRoot"/>
+        <p:cTn xmlns:p14="http://schemas.microsoft.com/office/powerpoint/2010/main" id="1" dur="indefinite" restart="never" nodeType="tmRoot"/>
       </p:par>
     </p:tnLst>
   </p:timing>
@@ -3441,20 +3449,44 @@
               <a:t>es un juego de plataformas en 2D desarrollado con el motor </a:t>
             </a:r>
             <a:r>
+              <a:rPr lang="es-ES_tradnl" dirty="0" err="1"/>
+              <a:t>Q</a:t>
+            </a:r>
+            <a:r>
               <a:rPr lang="es-ES_tradnl" dirty="0" err="1" smtClean="0"/>
-              <a:t>quintus</a:t>
+              <a:t>uintus</a:t>
             </a:r>
             <a:r>
               <a:rPr lang="es-ES_tradnl" dirty="0" smtClean="0"/>
-              <a:t> y </a:t>
+              <a:t> </a:t>
+            </a:r>
+            <a:r>
+              <a:rPr lang="es-ES_tradnl" dirty="0" smtClean="0"/>
+              <a:t>y </a:t>
+            </a:r>
+            <a:r>
+              <a:rPr lang="es-ES_tradnl" dirty="0" smtClean="0"/>
+              <a:t>J</a:t>
+            </a:r>
+            <a:r>
+              <a:rPr lang="es-ES_tradnl" dirty="0" smtClean="0"/>
+              <a:t>avaScript</a:t>
+            </a:r>
+            <a:r>
+              <a:rPr lang="es-ES_tradnl" dirty="0" smtClean="0"/>
+              <a:t>, en el cual nuestro personaje, un </a:t>
             </a:r>
             <a:r>
               <a:rPr lang="es-ES_tradnl" dirty="0" err="1" smtClean="0"/>
-              <a:t>javascript</a:t>
+              <a:t>zombie</a:t>
             </a:r>
             <a:r>
               <a:rPr lang="es-ES_tradnl" dirty="0" smtClean="0"/>
-              <a:t>, en el cual nuestro personaje, un zombi cansado del trato vejatorio que reciben él y los suyos por parte de los humanos, decide tomarse la justicia por su mano y asaltar el edificio presidencial para alcanzar el poder y sembrar el terror en el mundo.</a:t>
+              <a:t> </a:t>
+            </a:r>
+            <a:r>
+              <a:rPr lang="es-ES_tradnl" dirty="0" smtClean="0"/>
+              <a:t>cansado del trato vejatorio que reciben él y los suyos por parte de los humanos, decide tomarse la justicia por su mano y asaltar el edificio presidencial para alcanzar el poder y sembrar el terror en el mundo.</a:t>
             </a:r>
             <a:endParaRPr lang="es-ES" dirty="0" smtClean="0"/>
           </a:p>
@@ -3498,7 +3530,7 @@
   <p:timing>
     <p:tnLst>
       <p:par>
-        <p:cTn id="1" dur="indefinite" restart="never" nodeType="tmRoot"/>
+        <p:cTn xmlns:p14="http://schemas.microsoft.com/office/powerpoint/2010/main" id="1" dur="indefinite" restart="never" nodeType="tmRoot"/>
       </p:par>
     </p:tnLst>
   </p:timing>
@@ -3757,7 +3789,7 @@
   <p:timing>
     <p:tnLst>
       <p:par>
-        <p:cTn id="1" dur="indefinite" restart="never" nodeType="tmRoot"/>
+        <p:cTn xmlns:p14="http://schemas.microsoft.com/office/powerpoint/2010/main" id="1" dur="indefinite" restart="never" nodeType="tmRoot"/>
       </p:par>
     </p:tnLst>
   </p:timing>
@@ -3805,7 +3837,27 @@
             </a:r>
             <a:r>
               <a:rPr lang="es-ES_tradnl" dirty="0" smtClean="0"/>
-              <a:t>: Si el zombi está en colisión con una caja, al pulsar </a:t>
+              <a:t>: Si el </a:t>
+            </a:r>
+            <a:r>
+              <a:rPr lang="es-ES_tradnl" dirty="0" err="1" smtClean="0"/>
+              <a:t>zombie</a:t>
+            </a:r>
+            <a:r>
+              <a:rPr lang="es-ES_tradnl" dirty="0" smtClean="0"/>
+              <a:t> está </a:t>
+            </a:r>
+            <a:r>
+              <a:rPr lang="es-ES_tradnl" dirty="0" smtClean="0"/>
+              <a:t>en </a:t>
+            </a:r>
+            <a:r>
+              <a:rPr lang="es-ES_tradnl" dirty="0" smtClean="0"/>
+              <a:t>colisión lateral </a:t>
+            </a:r>
+            <a:r>
+              <a:rPr lang="es-ES_tradnl" dirty="0" smtClean="0"/>
+              <a:t>con una caja, al pulsar </a:t>
             </a:r>
             <a:r>
               <a:rPr lang="es-ES_tradnl" dirty="0" smtClean="0">
@@ -3845,7 +3897,15 @@
             </a:r>
             <a:r>
               <a:rPr lang="es-ES_tradnl" dirty="0" smtClean="0"/>
-              <a:t> si está a la derecha de la misma, este escalará dicha caja, para seguir avanzando en el nivel.</a:t>
+              <a:t> si está a la derecha de la misma, </a:t>
+            </a:r>
+            <a:r>
+              <a:rPr lang="es-ES_tradnl" dirty="0" smtClean="0"/>
+              <a:t>este la escalará, </a:t>
+            </a:r>
+            <a:r>
+              <a:rPr lang="es-ES_tradnl" dirty="0" smtClean="0"/>
+              <a:t>para seguir avanzando en el nivel.</a:t>
             </a:r>
           </a:p>
           <a:p>
@@ -3860,7 +3920,19 @@
             </a:r>
             <a:r>
               <a:rPr lang="es-ES_tradnl" dirty="0" smtClean="0"/>
-              <a:t>: El zombi podrá ir recogiendo munición, que luego podrá lanzar a sus enemigos. Los disparos se llevan a cabo con la tecla ‘espacio’. Si el zombi no tiene munición, no podrá disparar.</a:t>
+              <a:t>: El </a:t>
+            </a:r>
+            <a:r>
+              <a:rPr lang="es-ES_tradnl" dirty="0" err="1" smtClean="0"/>
+              <a:t>zombie</a:t>
+            </a:r>
+            <a:r>
+              <a:rPr lang="es-ES_tradnl" dirty="0" smtClean="0"/>
+              <a:t> </a:t>
+            </a:r>
+            <a:r>
+              <a:rPr lang="es-ES_tradnl" dirty="0" smtClean="0"/>
+              <a:t>podrá ir recogiendo munición, que luego podrá lanzar a sus enemigos. Los disparos se llevan a cabo con la tecla ‘espacio’. Si el zombi no tiene munición, no podrá disparar.</a:t>
             </a:r>
             <a:endParaRPr lang="es-ES" dirty="0" smtClean="0"/>
           </a:p>
@@ -3907,7 +3979,7 @@
   <p:timing>
     <p:tnLst>
       <p:par>
-        <p:cTn id="1" dur="indefinite" restart="never" nodeType="tmRoot"/>
+        <p:cTn xmlns:p14="http://schemas.microsoft.com/office/powerpoint/2010/main" id="1" dur="indefinite" restart="never" nodeType="tmRoot"/>
       </p:par>
     </p:tnLst>
   </p:timing>
@@ -3953,7 +4025,15 @@
             </a:r>
             <a:r>
               <a:rPr lang="es-ES_tradnl" dirty="0" smtClean="0"/>
-              <a:t>: Nuestro zombi puede ocultarse bajo tierra en algunos puntos del nivel, para no estar expuesto a los disparos de los escoltas del presidente. Para ocultarnos bajo tierra, pulsaremos la tecla de dirección </a:t>
+              <a:t>: Nuestro zombi puede </a:t>
+            </a:r>
+            <a:r>
+              <a:rPr lang="es-ES_tradnl" dirty="0" smtClean="0"/>
+              <a:t>ocultarse y avanzar </a:t>
+            </a:r>
+            <a:r>
+              <a:rPr lang="es-ES_tradnl" dirty="0" smtClean="0"/>
+              <a:t>bajo tierra en algunos puntos del nivel, para no estar expuesto a los disparos de los escoltas del presidente. Para ocultarnos bajo tierra, pulsaremos la tecla de dirección </a:t>
             </a:r>
             <a:r>
               <a:rPr lang="es-ES_tradnl" dirty="0" smtClean="0">
@@ -4029,7 +4109,7 @@
   <p:timing>
     <p:tnLst>
       <p:par>
-        <p:cTn id="1" dur="indefinite" restart="never" nodeType="tmRoot"/>
+        <p:cTn xmlns:p14="http://schemas.microsoft.com/office/powerpoint/2010/main" id="1" dur="indefinite" restart="never" nodeType="tmRoot"/>
       </p:par>
     </p:tnLst>
   </p:timing>
@@ -4065,7 +4145,9 @@
         </p:nvSpPr>
         <p:spPr/>
         <p:txBody>
-          <a:bodyPr/>
+          <a:bodyPr>
+            <a:normAutofit fontScale="90000"/>
+          </a:bodyPr>
           <a:lstStyle/>
           <a:p>
             <a:pPr algn="ctr"/>
@@ -4587,7 +4669,7 @@
   <p:timing>
     <p:tnLst>
       <p:par>
-        <p:cTn id="1" dur="indefinite" restart="never" nodeType="tmRoot"/>
+        <p:cTn xmlns:p14="http://schemas.microsoft.com/office/powerpoint/2010/main" id="1" dur="indefinite" restart="never" nodeType="tmRoot"/>
       </p:par>
     </p:tnLst>
   </p:timing>
@@ -4634,11 +4716,7 @@
             <a:pPr algn="just"/>
             <a:r>
               <a:rPr lang="es-ES" dirty="0" smtClean="0"/>
-              <a:t>Lo que h</a:t>
-            </a:r>
-            <a:r>
-              <a:rPr lang="es-ES" dirty="0" smtClean="0"/>
-              <a:t>a ido bien: Organización de los archivos de nuestro juego, implementación de algunas mecánicas, la creación de escenas del juego, el HUD, </a:t>
+              <a:t>Lo que ha ido bien: Organización de los archivos de nuestro juego, implementación de algunas mecánicas, la creación de escenas del juego, el HUD, </a:t>
             </a:r>
             <a:r>
               <a:rPr lang="es-ES" dirty="0" err="1" smtClean="0"/>
@@ -4695,7 +4773,7 @@
   <p:timing>
     <p:tnLst>
       <p:par>
-        <p:cTn id="1" dur="indefinite" restart="never" nodeType="tmRoot"/>
+        <p:cTn xmlns:p14="http://schemas.microsoft.com/office/powerpoint/2010/main" id="1" dur="indefinite" restart="never" nodeType="tmRoot"/>
       </p:par>
     </p:tnLst>
   </p:timing>
@@ -4749,13 +4827,8 @@
             <a:pPr algn="just"/>
             <a:r>
               <a:rPr lang="es-ES" dirty="0" smtClean="0"/>
-              <a:t>Implementar el jefe final (presidente) y su comportamiento</a:t>
-            </a:r>
-            <a:r>
-              <a:rPr lang="es-ES" dirty="0" smtClean="0"/>
-              <a:t>. Final del juego.</a:t>
-            </a:r>
-            <a:endParaRPr lang="es-ES" dirty="0" smtClean="0"/>
+              <a:t>Implementar el jefe final (presidente) y su comportamiento. Final del juego.</a:t>
+            </a:r>
           </a:p>
           <a:p>
             <a:pPr algn="just"/>
@@ -4820,7 +4893,7 @@
   <p:timing>
     <p:tnLst>
       <p:par>
-        <p:cTn id="1" dur="indefinite" restart="never" nodeType="tmRoot"/>
+        <p:cTn xmlns:p14="http://schemas.microsoft.com/office/powerpoint/2010/main" id="1" dur="indefinite" restart="never" nodeType="tmRoot"/>
       </p:par>
     </p:tnLst>
   </p:timing>

</xml_diff>

<commit_message>
levelPrueba.tmx y corregido bug bajo tierra
</commit_message>
<xml_diff>
--- a/zombiesppt.pptx
+++ b/zombiesppt.pptx
@@ -405,7 +405,7 @@
             <a:fld id="{BD3AD817-10B2-41E6-93DF-32BB2CD4AA9E}" type="datetimeFigureOut">
               <a:rPr lang="es-ES" smtClean="0"/>
               <a:pPr/>
-              <a:t>25/05/14</a:t>
+              <a:t>27/05/2014</a:t>
             </a:fld>
             <a:endParaRPr lang="es-ES"/>
           </a:p>
@@ -429,7 +429,7 @@
             <a:fld id="{41129089-902B-4826-A5A2-7EE54EC08807}" type="slidenum">
               <a:rPr lang="es-ES" smtClean="0"/>
               <a:pPr/>
-              <a:t>‹Nr.›</a:t>
+              <a:t>‹Nº›</a:t>
             </a:fld>
             <a:endParaRPr lang="es-ES"/>
           </a:p>
@@ -572,7 +572,7 @@
             <a:fld id="{BD3AD817-10B2-41E6-93DF-32BB2CD4AA9E}" type="datetimeFigureOut">
               <a:rPr lang="es-ES" smtClean="0"/>
               <a:pPr/>
-              <a:t>25/05/14</a:t>
+              <a:t>27/05/2014</a:t>
             </a:fld>
             <a:endParaRPr lang="es-ES"/>
           </a:p>
@@ -615,7 +615,7 @@
             <a:fld id="{41129089-902B-4826-A5A2-7EE54EC08807}" type="slidenum">
               <a:rPr lang="es-ES" smtClean="0"/>
               <a:pPr/>
-              <a:t>‹Nr.›</a:t>
+              <a:t>‹Nº›</a:t>
             </a:fld>
             <a:endParaRPr lang="es-ES"/>
           </a:p>
@@ -749,7 +749,7 @@
             <a:fld id="{BD3AD817-10B2-41E6-93DF-32BB2CD4AA9E}" type="datetimeFigureOut">
               <a:rPr lang="es-ES" smtClean="0"/>
               <a:pPr/>
-              <a:t>25/05/14</a:t>
+              <a:t>27/05/2014</a:t>
             </a:fld>
             <a:endParaRPr lang="es-ES"/>
           </a:p>
@@ -792,7 +792,7 @@
             <a:fld id="{41129089-902B-4826-A5A2-7EE54EC08807}" type="slidenum">
               <a:rPr lang="es-ES" smtClean="0"/>
               <a:pPr/>
-              <a:t>‹Nr.›</a:t>
+              <a:t>‹Nº›</a:t>
             </a:fld>
             <a:endParaRPr lang="es-ES"/>
           </a:p>
@@ -898,7 +898,7 @@
             <a:fld id="{BD3AD817-10B2-41E6-93DF-32BB2CD4AA9E}" type="datetimeFigureOut">
               <a:rPr lang="es-ES" smtClean="0"/>
               <a:pPr/>
-              <a:t>25/05/14</a:t>
+              <a:t>27/05/2014</a:t>
             </a:fld>
             <a:endParaRPr lang="es-ES"/>
           </a:p>
@@ -926,7 +926,7 @@
             <a:fld id="{41129089-902B-4826-A5A2-7EE54EC08807}" type="slidenum">
               <a:rPr lang="es-ES" smtClean="0"/>
               <a:pPr/>
-              <a:t>‹Nr.›</a:t>
+              <a:t>‹Nº›</a:t>
             </a:fld>
             <a:endParaRPr lang="es-ES"/>
           </a:p>
@@ -1017,7 +1017,7 @@
             <a:fld id="{BD3AD817-10B2-41E6-93DF-32BB2CD4AA9E}" type="datetimeFigureOut">
               <a:rPr lang="es-ES" smtClean="0"/>
               <a:pPr/>
-              <a:t>25/05/14</a:t>
+              <a:t>27/05/2014</a:t>
             </a:fld>
             <a:endParaRPr lang="es-ES"/>
           </a:p>
@@ -1060,7 +1060,7 @@
             <a:fld id="{41129089-902B-4826-A5A2-7EE54EC08807}" type="slidenum">
               <a:rPr lang="es-ES" smtClean="0"/>
               <a:pPr/>
-              <a:t>‹Nr.›</a:t>
+              <a:t>‹Nº›</a:t>
             </a:fld>
             <a:endParaRPr lang="es-ES"/>
           </a:p>
@@ -1289,7 +1289,7 @@
             <a:fld id="{BD3AD817-10B2-41E6-93DF-32BB2CD4AA9E}" type="datetimeFigureOut">
               <a:rPr lang="es-ES" smtClean="0"/>
               <a:pPr/>
-              <a:t>25/05/14</a:t>
+              <a:t>27/05/2014</a:t>
             </a:fld>
             <a:endParaRPr lang="es-ES"/>
           </a:p>
@@ -1332,7 +1332,7 @@
             <a:fld id="{41129089-902B-4826-A5A2-7EE54EC08807}" type="slidenum">
               <a:rPr lang="es-ES" smtClean="0"/>
               <a:pPr/>
-              <a:t>‹Nr.›</a:t>
+              <a:t>‹Nº›</a:t>
             </a:fld>
             <a:endParaRPr lang="es-ES"/>
           </a:p>
@@ -1518,7 +1518,7 @@
             <a:fld id="{41129089-902B-4826-A5A2-7EE54EC08807}" type="slidenum">
               <a:rPr lang="es-ES" smtClean="0"/>
               <a:pPr/>
-              <a:t>‹Nr.›</a:t>
+              <a:t>‹Nº›</a:t>
             </a:fld>
             <a:endParaRPr lang="es-ES"/>
           </a:p>
@@ -1561,7 +1561,7 @@
             <a:fld id="{BD3AD817-10B2-41E6-93DF-32BB2CD4AA9E}" type="datetimeFigureOut">
               <a:rPr lang="es-ES" smtClean="0"/>
               <a:pPr/>
-              <a:t>25/05/14</a:t>
+              <a:t>27/05/2014</a:t>
             </a:fld>
             <a:endParaRPr lang="es-ES"/>
           </a:p>
@@ -2009,7 +2009,7 @@
             <a:fld id="{BD3AD817-10B2-41E6-93DF-32BB2CD4AA9E}" type="datetimeFigureOut">
               <a:rPr lang="es-ES" smtClean="0"/>
               <a:pPr/>
-              <a:t>25/05/14</a:t>
+              <a:t>27/05/2014</a:t>
             </a:fld>
             <a:endParaRPr lang="es-ES"/>
           </a:p>
@@ -2052,7 +2052,7 @@
             <a:fld id="{41129089-902B-4826-A5A2-7EE54EC08807}" type="slidenum">
               <a:rPr lang="es-ES" smtClean="0"/>
               <a:pPr/>
-              <a:t>‹Nr.›</a:t>
+              <a:t>‹Nº›</a:t>
             </a:fld>
             <a:endParaRPr lang="es-ES"/>
           </a:p>
@@ -2124,7 +2124,7 @@
             <a:fld id="{BD3AD817-10B2-41E6-93DF-32BB2CD4AA9E}" type="datetimeFigureOut">
               <a:rPr lang="es-ES" smtClean="0"/>
               <a:pPr/>
-              <a:t>25/05/14</a:t>
+              <a:t>27/05/2014</a:t>
             </a:fld>
             <a:endParaRPr lang="es-ES"/>
           </a:p>
@@ -2167,7 +2167,7 @@
             <a:fld id="{41129089-902B-4826-A5A2-7EE54EC08807}" type="slidenum">
               <a:rPr lang="es-ES" smtClean="0"/>
               <a:pPr/>
-              <a:t>‹Nr.›</a:t>
+              <a:t>‹Nº›</a:t>
             </a:fld>
             <a:endParaRPr lang="es-ES"/>
           </a:p>
@@ -2376,7 +2376,7 @@
             <a:fld id="{BD3AD817-10B2-41E6-93DF-32BB2CD4AA9E}" type="datetimeFigureOut">
               <a:rPr lang="es-ES" smtClean="0"/>
               <a:pPr/>
-              <a:t>25/05/14</a:t>
+              <a:t>27/05/2014</a:t>
             </a:fld>
             <a:endParaRPr lang="es-ES"/>
           </a:p>
@@ -2400,7 +2400,7 @@
             <a:fld id="{41129089-902B-4826-A5A2-7EE54EC08807}" type="slidenum">
               <a:rPr lang="es-ES" smtClean="0"/>
               <a:pPr/>
-              <a:t>‹Nr.›</a:t>
+              <a:t>‹Nº›</a:t>
             </a:fld>
             <a:endParaRPr lang="es-ES"/>
           </a:p>
@@ -2618,7 +2618,7 @@
             <a:fld id="{BD3AD817-10B2-41E6-93DF-32BB2CD4AA9E}" type="datetimeFigureOut">
               <a:rPr lang="es-ES" smtClean="0"/>
               <a:pPr/>
-              <a:t>25/05/14</a:t>
+              <a:t>27/05/2014</a:t>
             </a:fld>
             <a:endParaRPr lang="es-ES"/>
           </a:p>
@@ -2642,7 +2642,7 @@
             <a:fld id="{41129089-902B-4826-A5A2-7EE54EC08807}" type="slidenum">
               <a:rPr lang="es-ES" smtClean="0"/>
               <a:pPr/>
-              <a:t>‹Nr.›</a:t>
+              <a:t>‹Nº›</a:t>
             </a:fld>
             <a:endParaRPr lang="es-ES"/>
           </a:p>
@@ -2793,7 +2793,7 @@
             <a:fld id="{BD3AD817-10B2-41E6-93DF-32BB2CD4AA9E}" type="datetimeFigureOut">
               <a:rPr lang="es-ES" smtClean="0"/>
               <a:pPr/>
-              <a:t>25/05/14</a:t>
+              <a:t>27/05/2014</a:t>
             </a:fld>
             <a:endParaRPr lang="es-ES"/>
           </a:p>
@@ -2871,7 +2871,7 @@
             <a:fld id="{41129089-902B-4826-A5A2-7EE54EC08807}" type="slidenum">
               <a:rPr lang="es-ES" smtClean="0"/>
               <a:pPr/>
-              <a:t>‹Nr.›</a:t>
+              <a:t>‹Nº›</a:t>
             </a:fld>
             <a:endParaRPr lang="es-ES"/>
           </a:p>
@@ -3267,61 +3267,6 @@
       </p:grpSpPr>
       <p:sp>
         <p:nvSpPr>
-          <p:cNvPr id="3" name="2 Subtítulo"/>
-          <p:cNvSpPr>
-            <a:spLocks noGrp="1"/>
-          </p:cNvSpPr>
-          <p:nvPr>
-            <p:ph type="subTitle" idx="1"/>
-          </p:nvPr>
-        </p:nvSpPr>
-        <p:spPr>
-          <a:xfrm>
-            <a:off x="467544" y="4365104"/>
-            <a:ext cx="8305800" cy="1143000"/>
-          </a:xfrm>
-        </p:spPr>
-        <p:txBody>
-          <a:bodyPr>
-            <a:noAutofit/>
-          </a:bodyPr>
-          <a:lstStyle/>
-          <a:p>
-            <a:r>
-              <a:rPr lang="es-ES" dirty="0" smtClean="0"/>
-              <a:t>Laura María de Castro </a:t>
-            </a:r>
-            <a:r>
-              <a:rPr lang="es-ES" dirty="0" err="1" smtClean="0"/>
-              <a:t>Saturio</a:t>
-            </a:r>
-            <a:endParaRPr lang="es-ES" dirty="0" smtClean="0"/>
-          </a:p>
-          <a:p>
-            <a:r>
-              <a:rPr lang="es-ES" dirty="0" smtClean="0"/>
-              <a:t>Iván Méndez </a:t>
-            </a:r>
-            <a:r>
-              <a:rPr lang="es-ES" dirty="0" smtClean="0"/>
-              <a:t>Jiménez</a:t>
-            </a:r>
-          </a:p>
-          <a:p>
-            <a:r>
-              <a:rPr lang="es-ES" dirty="0" smtClean="0"/>
-              <a:t>Daniel </a:t>
-            </a:r>
-            <a:r>
-              <a:rPr lang="es-ES" dirty="0" smtClean="0"/>
-              <a:t>Serrano Torres					</a:t>
-            </a:r>
-            <a:endParaRPr lang="es-ES" dirty="0"/>
-          </a:p>
-        </p:txBody>
-      </p:sp>
-      <p:sp>
-        <p:nvSpPr>
           <p:cNvPr id="2" name="1 Título"/>
           <p:cNvSpPr>
             <a:spLocks noGrp="1"/>
@@ -3361,6 +3306,54 @@
               <a:t>president</a:t>
             </a:r>
             <a:endParaRPr lang="es-ES" sz="6600" dirty="0"/>
+          </a:p>
+        </p:txBody>
+      </p:sp>
+      <p:sp>
+        <p:nvSpPr>
+          <p:cNvPr id="4" name="3 Subtítulo"/>
+          <p:cNvSpPr>
+            <a:spLocks noGrp="1"/>
+          </p:cNvSpPr>
+          <p:nvPr>
+            <p:ph type="subTitle" idx="1"/>
+          </p:nvPr>
+        </p:nvSpPr>
+        <p:spPr>
+          <a:xfrm>
+            <a:off x="467544" y="4077072"/>
+            <a:ext cx="8305800" cy="1143000"/>
+          </a:xfrm>
+        </p:spPr>
+        <p:txBody>
+          <a:bodyPr/>
+          <a:lstStyle/>
+          <a:p>
+            <a:r>
+              <a:rPr lang="es-ES" dirty="0"/>
+              <a:t>Laura María de Castro </a:t>
+            </a:r>
+            <a:r>
+              <a:rPr lang="es-ES" dirty="0" err="1"/>
+              <a:t>Saturio</a:t>
+            </a:r>
+            <a:endParaRPr lang="es-ES" dirty="0"/>
+          </a:p>
+          <a:p>
+            <a:r>
+              <a:rPr lang="es-ES" dirty="0"/>
+              <a:t>Iván Méndez </a:t>
+            </a:r>
+            <a:r>
+              <a:rPr lang="es-ES" dirty="0" smtClean="0"/>
+              <a:t>Jiménez</a:t>
+            </a:r>
+          </a:p>
+          <a:p>
+            <a:r>
+              <a:rPr lang="es-ES" dirty="0" smtClean="0"/>
+              <a:t>Daniel Serrano Torres</a:t>
+            </a:r>
           </a:p>
         </p:txBody>
       </p:sp>
@@ -3369,11 +3362,11 @@
   <p:clrMapOvr>
     <a:masterClrMapping/>
   </p:clrMapOvr>
-  <p:transition xmlns:p14="http://schemas.microsoft.com/office/powerpoint/2010/main"/>
+  <p:transition/>
   <p:timing>
     <p:tnLst>
       <p:par>
-        <p:cTn xmlns:p14="http://schemas.microsoft.com/office/powerpoint/2010/main" id="1" dur="indefinite" restart="never" nodeType="tmRoot"/>
+        <p:cTn id="1" dur="indefinite" restart="never" nodeType="tmRoot"/>
       </p:par>
     </p:tnLst>
   </p:timing>
@@ -3458,23 +3451,7 @@
             </a:r>
             <a:r>
               <a:rPr lang="es-ES_tradnl" dirty="0" smtClean="0"/>
-              <a:t> </a:t>
-            </a:r>
-            <a:r>
-              <a:rPr lang="es-ES_tradnl" dirty="0" smtClean="0"/>
-              <a:t>y </a:t>
-            </a:r>
-            <a:r>
-              <a:rPr lang="es-ES_tradnl" dirty="0" smtClean="0"/>
-              <a:t>J</a:t>
-            </a:r>
-            <a:r>
-              <a:rPr lang="es-ES_tradnl" dirty="0" smtClean="0"/>
-              <a:t>avaScript</a:t>
-            </a:r>
-            <a:r>
-              <a:rPr lang="es-ES_tradnl" dirty="0" smtClean="0"/>
-              <a:t>, en el cual nuestro personaje, un </a:t>
+              <a:t> y JavaScript, en el cual nuestro personaje, un </a:t>
             </a:r>
             <a:r>
               <a:rPr lang="es-ES_tradnl" dirty="0" err="1" smtClean="0"/>
@@ -3482,11 +3459,7 @@
             </a:r>
             <a:r>
               <a:rPr lang="es-ES_tradnl" dirty="0" smtClean="0"/>
-              <a:t> </a:t>
-            </a:r>
-            <a:r>
-              <a:rPr lang="es-ES_tradnl" dirty="0" smtClean="0"/>
-              <a:t>cansado del trato vejatorio que reciben él y los suyos por parte de los humanos, decide tomarse la justicia por su mano y asaltar el edificio presidencial para alcanzar el poder y sembrar el terror en el mundo.</a:t>
+              <a:t> cansado del trato vejatorio que reciben él y los suyos por parte de los humanos, decide tomarse la justicia por su mano y asaltar el edificio presidencial para alcanzar el poder y sembrar el terror en el mundo.</a:t>
             </a:r>
             <a:endParaRPr lang="es-ES" dirty="0" smtClean="0"/>
           </a:p>
@@ -3530,7 +3503,7 @@
   <p:timing>
     <p:tnLst>
       <p:par>
-        <p:cTn xmlns:p14="http://schemas.microsoft.com/office/powerpoint/2010/main" id="1" dur="indefinite" restart="never" nodeType="tmRoot"/>
+        <p:cTn id="1" dur="indefinite" restart="never" nodeType="tmRoot"/>
       </p:par>
     </p:tnLst>
   </p:timing>
@@ -3789,7 +3762,7 @@
   <p:timing>
     <p:tnLst>
       <p:par>
-        <p:cTn xmlns:p14="http://schemas.microsoft.com/office/powerpoint/2010/main" id="1" dur="indefinite" restart="never" nodeType="tmRoot"/>
+        <p:cTn id="1" dur="indefinite" restart="never" nodeType="tmRoot"/>
       </p:par>
     </p:tnLst>
   </p:timing>
@@ -3845,19 +3818,7 @@
             </a:r>
             <a:r>
               <a:rPr lang="es-ES_tradnl" dirty="0" smtClean="0"/>
-              <a:t> está </a:t>
-            </a:r>
-            <a:r>
-              <a:rPr lang="es-ES_tradnl" dirty="0" smtClean="0"/>
-              <a:t>en </a:t>
-            </a:r>
-            <a:r>
-              <a:rPr lang="es-ES_tradnl" dirty="0" smtClean="0"/>
-              <a:t>colisión lateral </a:t>
-            </a:r>
-            <a:r>
-              <a:rPr lang="es-ES_tradnl" dirty="0" smtClean="0"/>
-              <a:t>con una caja, al pulsar </a:t>
+              <a:t> está en colisión lateral con una caja, al pulsar </a:t>
             </a:r>
             <a:r>
               <a:rPr lang="es-ES_tradnl" dirty="0" smtClean="0">
@@ -3897,15 +3858,7 @@
             </a:r>
             <a:r>
               <a:rPr lang="es-ES_tradnl" dirty="0" smtClean="0"/>
-              <a:t> si está a la derecha de la misma, </a:t>
-            </a:r>
-            <a:r>
-              <a:rPr lang="es-ES_tradnl" dirty="0" smtClean="0"/>
-              <a:t>este la escalará, </a:t>
-            </a:r>
-            <a:r>
-              <a:rPr lang="es-ES_tradnl" dirty="0" smtClean="0"/>
-              <a:t>para seguir avanzando en el nivel.</a:t>
+              <a:t> si está a la derecha de la misma, este la escalará, para seguir avanzando en el nivel.</a:t>
             </a:r>
           </a:p>
           <a:p>
@@ -3928,11 +3881,7 @@
             </a:r>
             <a:r>
               <a:rPr lang="es-ES_tradnl" dirty="0" smtClean="0"/>
-              <a:t> </a:t>
-            </a:r>
-            <a:r>
-              <a:rPr lang="es-ES_tradnl" dirty="0" smtClean="0"/>
-              <a:t>podrá ir recogiendo munición, que luego podrá lanzar a sus enemigos. Los disparos se llevan a cabo con la tecla ‘espacio’. Si el zombi no tiene munición, no podrá disparar.</a:t>
+              <a:t> podrá ir recogiendo munición, que luego podrá lanzar a sus enemigos. Los disparos se llevan a cabo con la tecla ‘espacio’. Si el zombi no tiene munición, no podrá disparar.</a:t>
             </a:r>
             <a:endParaRPr lang="es-ES" dirty="0" smtClean="0"/>
           </a:p>
@@ -3979,7 +3928,7 @@
   <p:timing>
     <p:tnLst>
       <p:par>
-        <p:cTn xmlns:p14="http://schemas.microsoft.com/office/powerpoint/2010/main" id="1" dur="indefinite" restart="never" nodeType="tmRoot"/>
+        <p:cTn id="1" dur="indefinite" restart="never" nodeType="tmRoot"/>
       </p:par>
     </p:tnLst>
   </p:timing>
@@ -4025,15 +3974,7 @@
             </a:r>
             <a:r>
               <a:rPr lang="es-ES_tradnl" dirty="0" smtClean="0"/>
-              <a:t>: Nuestro zombi puede </a:t>
-            </a:r>
-            <a:r>
-              <a:rPr lang="es-ES_tradnl" dirty="0" smtClean="0"/>
-              <a:t>ocultarse y avanzar </a:t>
-            </a:r>
-            <a:r>
-              <a:rPr lang="es-ES_tradnl" dirty="0" smtClean="0"/>
-              <a:t>bajo tierra en algunos puntos del nivel, para no estar expuesto a los disparos de los escoltas del presidente. Para ocultarnos bajo tierra, pulsaremos la tecla de dirección </a:t>
+              <a:t>: Nuestro zombi puede ocultarse y avanzar bajo tierra en algunos puntos del nivel, para no estar expuesto a los disparos de los escoltas del presidente. Para ocultarnos bajo tierra, pulsaremos la tecla de dirección </a:t>
             </a:r>
             <a:r>
               <a:rPr lang="es-ES_tradnl" dirty="0" smtClean="0">
@@ -4109,7 +4050,7 @@
   <p:timing>
     <p:tnLst>
       <p:par>
-        <p:cTn xmlns:p14="http://schemas.microsoft.com/office/powerpoint/2010/main" id="1" dur="indefinite" restart="never" nodeType="tmRoot"/>
+        <p:cTn id="1" dur="indefinite" restart="never" nodeType="tmRoot"/>
       </p:par>
     </p:tnLst>
   </p:timing>
@@ -4146,7 +4087,7 @@
         <p:spPr/>
         <p:txBody>
           <a:bodyPr>
-            <a:normAutofit fontScale="90000"/>
+            <a:normAutofit/>
           </a:bodyPr>
           <a:lstStyle/>
           <a:p>
@@ -4669,7 +4610,7 @@
   <p:timing>
     <p:tnLst>
       <p:par>
-        <p:cTn xmlns:p14="http://schemas.microsoft.com/office/powerpoint/2010/main" id="1" dur="indefinite" restart="never" nodeType="tmRoot"/>
+        <p:cTn id="1" dur="indefinite" restart="never" nodeType="tmRoot"/>
       </p:par>
     </p:tnLst>
   </p:timing>
@@ -4773,7 +4714,7 @@
   <p:timing>
     <p:tnLst>
       <p:par>
-        <p:cTn xmlns:p14="http://schemas.microsoft.com/office/powerpoint/2010/main" id="1" dur="indefinite" restart="never" nodeType="tmRoot"/>
+        <p:cTn id="1" dur="indefinite" restart="never" nodeType="tmRoot"/>
       </p:par>
     </p:tnLst>
   </p:timing>
@@ -4893,7 +4834,7 @@
   <p:timing>
     <p:tnLst>
       <p:par>
-        <p:cTn xmlns:p14="http://schemas.microsoft.com/office/powerpoint/2010/main" id="1" dur="indefinite" restart="never" nodeType="tmRoot"/>
+        <p:cTn id="1" dur="indefinite" restart="never" nodeType="tmRoot"/>
       </p:par>
     </p:tnLst>
   </p:timing>

</xml_diff>

<commit_message>
anhadida diapositiva con la jerarquia de clases y componenetes
</commit_message>
<xml_diff>
--- a/zombiesppt.pptx
+++ b/zombiesppt.pptx
@@ -11,8 +11,9 @@
     <p:sldId id="259" r:id="rId5"/>
     <p:sldId id="260" r:id="rId6"/>
     <p:sldId id="263" r:id="rId7"/>
-    <p:sldId id="262" r:id="rId8"/>
-    <p:sldId id="261" r:id="rId9"/>
+    <p:sldId id="264" r:id="rId8"/>
+    <p:sldId id="262" r:id="rId9"/>
+    <p:sldId id="261" r:id="rId10"/>
   </p:sldIdLst>
   <p:sldSz cx="9144000" cy="6858000" type="screen4x3"/>
   <p:notesSz cx="6858000" cy="9144000"/>
@@ -3573,7 +3574,7 @@
           <a:blip r:embed="rId2" cstate="print">
             <a:extLst>
               <a:ext uri="{28A0092B-C50C-407E-A947-70E740481C1C}">
-                <a14:useLocalDpi xmlns:a14="http://schemas.microsoft.com/office/drawing/2010/main" val="0"/>
+                <a14:useLocalDpi xmlns:a14="http://schemas.microsoft.com/office/drawing/2010/main" xmlns="" val="0"/>
               </a:ext>
             </a:extLst>
           </a:blip>
@@ -3702,7 +3703,7 @@
           <a:blip r:embed="rId3" cstate="print">
             <a:extLst>
               <a:ext uri="{28A0092B-C50C-407E-A947-70E740481C1C}">
-                <a14:useLocalDpi xmlns:a14="http://schemas.microsoft.com/office/drawing/2010/main" val="0"/>
+                <a14:useLocalDpi xmlns:a14="http://schemas.microsoft.com/office/drawing/2010/main" xmlns="" val="0"/>
               </a:ext>
             </a:extLst>
           </a:blip>
@@ -4094,7 +4095,11 @@
             <a:pPr algn="ctr"/>
             <a:r>
               <a:rPr lang="es-ES" dirty="0" smtClean="0"/>
-              <a:t>Arquitectura de clase y componentes</a:t>
+              <a:t>Arquitectura </a:t>
+            </a:r>
+            <a:r>
+              <a:rPr lang="es-ES" dirty="0" smtClean="0"/>
+              <a:t>ficheros</a:t>
             </a:r>
             <a:endParaRPr lang="es-ES" dirty="0"/>
           </a:p>
@@ -4108,8 +4113,8 @@
         </p:nvSpPr>
         <p:spPr>
           <a:xfrm>
-            <a:off x="3851920" y="3573016"/>
-            <a:ext cx="1368152" cy="648072"/>
+            <a:off x="3635896" y="3573016"/>
+            <a:ext cx="1728192" cy="648072"/>
           </a:xfrm>
           <a:prstGeom prst="rect">
             <a:avLst/>
@@ -4138,7 +4143,7 @@
             <a:pPr algn="ctr"/>
             <a:r>
               <a:rPr lang="es-ES" dirty="0" smtClean="0"/>
-              <a:t>INDEX</a:t>
+              <a:t>INDEX.HTML</a:t>
             </a:r>
             <a:endParaRPr lang="es-ES" dirty="0"/>
           </a:p>
@@ -4153,7 +4158,7 @@
         <p:spPr>
           <a:xfrm>
             <a:off x="3707904" y="1916832"/>
-            <a:ext cx="1512168" cy="648072"/>
+            <a:ext cx="1656184" cy="648072"/>
           </a:xfrm>
           <a:prstGeom prst="rect">
             <a:avLst/>
@@ -4181,8 +4186,8 @@
           <a:p>
             <a:pPr algn="ctr"/>
             <a:r>
-              <a:rPr lang="es-ES" dirty="0" err="1" smtClean="0"/>
-              <a:t>Animations</a:t>
+              <a:rPr lang="es-ES" dirty="0" smtClean="0"/>
+              <a:t>Animations.js</a:t>
             </a:r>
             <a:endParaRPr lang="es-ES" dirty="0"/>
           </a:p>
@@ -4197,7 +4202,7 @@
         <p:spPr>
           <a:xfrm>
             <a:off x="6300192" y="4005064"/>
-            <a:ext cx="1584176" cy="648072"/>
+            <a:ext cx="1872208" cy="648072"/>
           </a:xfrm>
           <a:prstGeom prst="rect">
             <a:avLst/>
@@ -4225,8 +4230,8 @@
           <a:p>
             <a:pPr algn="ctr"/>
             <a:r>
-              <a:rPr lang="es-ES" dirty="0" err="1" smtClean="0"/>
-              <a:t>Components</a:t>
+              <a:rPr lang="es-ES" dirty="0" smtClean="0"/>
+              <a:t>Components.js</a:t>
             </a:r>
             <a:endParaRPr lang="es-ES" dirty="0"/>
           </a:p>
@@ -4269,8 +4274,8 @@
           <a:p>
             <a:pPr algn="ctr"/>
             <a:r>
-              <a:rPr lang="es-ES" dirty="0" err="1" smtClean="0"/>
-              <a:t>Core</a:t>
+              <a:rPr lang="es-ES" dirty="0" smtClean="0"/>
+              <a:t>Core.js</a:t>
             </a:r>
             <a:endParaRPr lang="es-ES" dirty="0"/>
           </a:p>
@@ -4313,8 +4318,8 @@
           <a:p>
             <a:pPr algn="ctr"/>
             <a:r>
-              <a:rPr lang="es-ES" dirty="0" err="1" smtClean="0"/>
-              <a:t>Entities</a:t>
+              <a:rPr lang="es-ES" dirty="0" smtClean="0"/>
+              <a:t>Entities.js</a:t>
             </a:r>
             <a:endParaRPr lang="es-ES" dirty="0"/>
           </a:p>
@@ -4357,8 +4362,8 @@
           <a:p>
             <a:pPr algn="ctr"/>
             <a:r>
-              <a:rPr lang="es-ES" dirty="0" err="1" smtClean="0"/>
-              <a:t>Scenes</a:t>
+              <a:rPr lang="es-ES" dirty="0" smtClean="0"/>
+              <a:t>Scenes.js</a:t>
             </a:r>
             <a:endParaRPr lang="es-ES" dirty="0"/>
           </a:p>
@@ -4374,9 +4379,9 @@
           <p:nvPr/>
         </p:nvCxnSpPr>
         <p:spPr>
-          <a:xfrm flipH="1" flipV="1">
-            <a:off x="4463988" y="2564904"/>
-            <a:ext cx="72008" cy="1008112"/>
+          <a:xfrm flipV="1">
+            <a:off x="4499992" y="2564904"/>
+            <a:ext cx="36004" cy="1008112"/>
           </a:xfrm>
           <a:prstGeom prst="line">
             <a:avLst/>
@@ -4519,9 +4524,9 @@
           <p:nvPr/>
         </p:nvCxnSpPr>
         <p:spPr>
-          <a:xfrm flipH="1">
+          <a:xfrm>
             <a:off x="4499992" y="4221088"/>
-            <a:ext cx="36004" cy="1224136"/>
+            <a:ext cx="0" cy="1224136"/>
           </a:xfrm>
           <a:prstGeom prst="line">
             <a:avLst/>
@@ -4636,76 +4641,759 @@
       </p:grpSpPr>
       <p:sp>
         <p:nvSpPr>
-          <p:cNvPr id="2" name="1 Marcador de contenido"/>
-          <p:cNvSpPr>
-            <a:spLocks noGrp="1"/>
-          </p:cNvSpPr>
-          <p:nvPr>
-            <p:ph idx="1"/>
-          </p:nvPr>
-        </p:nvSpPr>
-        <p:spPr>
-          <a:xfrm>
-            <a:off x="467544" y="1772816"/>
-            <a:ext cx="8229600" cy="4572000"/>
-          </a:xfrm>
-        </p:spPr>
-        <p:txBody>
-          <a:bodyPr/>
-          <a:lstStyle/>
-          <a:p>
-            <a:pPr algn="just"/>
+          <p:cNvPr id="3" name="2 Título"/>
+          <p:cNvSpPr>
+            <a:spLocks noGrp="1"/>
+          </p:cNvSpPr>
+          <p:nvPr>
+            <p:ph type="title"/>
+          </p:nvPr>
+        </p:nvSpPr>
+        <p:spPr>
+          <a:xfrm>
+            <a:off x="467544" y="260648"/>
+            <a:ext cx="8229600" cy="750912"/>
+          </a:xfrm>
+        </p:spPr>
+        <p:txBody>
+          <a:bodyPr>
+            <a:normAutofit fontScale="90000"/>
+          </a:bodyPr>
+          <a:lstStyle/>
+          <a:p>
+            <a:pPr algn="ctr"/>
             <a:r>
               <a:rPr lang="es-ES" dirty="0" smtClean="0"/>
-              <a:t>Lo que ha ido bien: Organización de los archivos de nuestro juego, implementación de algunas mecánicas, la creación de escenas del juego, el HUD, </a:t>
-            </a:r>
+              <a:t>Arquitectura </a:t>
+            </a:r>
+            <a:r>
+              <a:rPr lang="es-ES" dirty="0" smtClean="0"/>
+              <a:t>de clases y componentes</a:t>
+            </a:r>
+            <a:endParaRPr lang="es-ES" dirty="0"/>
+          </a:p>
+        </p:txBody>
+      </p:sp>
+      <p:sp>
+        <p:nvSpPr>
+          <p:cNvPr id="4" name="3 Rectángulo"/>
+          <p:cNvSpPr/>
+          <p:nvPr/>
+        </p:nvSpPr>
+        <p:spPr>
+          <a:xfrm>
+            <a:off x="2339752" y="2420888"/>
+            <a:ext cx="1440160" cy="648072"/>
+          </a:xfrm>
+          <a:prstGeom prst="rect">
+            <a:avLst/>
+          </a:prstGeom>
+        </p:spPr>
+        <p:style>
+          <a:lnRef idx="2">
+            <a:schemeClr val="accent1">
+              <a:shade val="50000"/>
+            </a:schemeClr>
+          </a:lnRef>
+          <a:fillRef idx="1">
+            <a:schemeClr val="accent1"/>
+          </a:fillRef>
+          <a:effectRef idx="0">
+            <a:schemeClr val="accent1"/>
+          </a:effectRef>
+          <a:fontRef idx="minor">
+            <a:schemeClr val="lt1"/>
+          </a:fontRef>
+        </p:style>
+        <p:txBody>
+          <a:bodyPr rtlCol="0" anchor="ctr"/>
+          <a:lstStyle/>
+          <a:p>
+            <a:pPr algn="ctr"/>
+            <a:r>
+              <a:rPr lang="es-ES" dirty="0" smtClean="0"/>
+              <a:t>Miembros</a:t>
+            </a:r>
+            <a:endParaRPr lang="es-ES" dirty="0"/>
+          </a:p>
+        </p:txBody>
+      </p:sp>
+      <p:sp>
+        <p:nvSpPr>
+          <p:cNvPr id="5" name="4 Rectángulo"/>
+          <p:cNvSpPr/>
+          <p:nvPr/>
+        </p:nvSpPr>
+        <p:spPr>
+          <a:xfrm>
+            <a:off x="3203848" y="3284984"/>
+            <a:ext cx="1656184" cy="648072"/>
+          </a:xfrm>
+          <a:prstGeom prst="rect">
+            <a:avLst/>
+          </a:prstGeom>
+        </p:spPr>
+        <p:style>
+          <a:lnRef idx="2">
+            <a:schemeClr val="accent1">
+              <a:shade val="50000"/>
+            </a:schemeClr>
+          </a:lnRef>
+          <a:fillRef idx="1">
+            <a:schemeClr val="accent1"/>
+          </a:fillRef>
+          <a:effectRef idx="0">
+            <a:schemeClr val="accent1"/>
+          </a:effectRef>
+          <a:fontRef idx="minor">
+            <a:schemeClr val="lt1"/>
+          </a:fontRef>
+        </p:style>
+        <p:txBody>
+          <a:bodyPr rtlCol="0" anchor="ctr"/>
+          <a:lstStyle/>
+          <a:p>
+            <a:pPr algn="ctr"/>
             <a:r>
               <a:rPr lang="es-ES" dirty="0" err="1" smtClean="0"/>
-              <a:t>sprites</a:t>
-            </a:r>
+              <a:t>Dirt</a:t>
+            </a:r>
+            <a:endParaRPr lang="es-ES" dirty="0"/>
+          </a:p>
+        </p:txBody>
+      </p:sp>
+      <p:sp>
+        <p:nvSpPr>
+          <p:cNvPr id="6" name="5 Rectángulo"/>
+          <p:cNvSpPr/>
+          <p:nvPr/>
+        </p:nvSpPr>
+        <p:spPr>
+          <a:xfrm>
+            <a:off x="3851920" y="4221088"/>
+            <a:ext cx="1872208" cy="648072"/>
+          </a:xfrm>
+          <a:prstGeom prst="rect">
+            <a:avLst/>
+          </a:prstGeom>
+        </p:spPr>
+        <p:style>
+          <a:lnRef idx="2">
+            <a:schemeClr val="accent1">
+              <a:shade val="50000"/>
+            </a:schemeClr>
+          </a:lnRef>
+          <a:fillRef idx="1">
+            <a:schemeClr val="accent1"/>
+          </a:fillRef>
+          <a:effectRef idx="0">
+            <a:schemeClr val="accent1"/>
+          </a:effectRef>
+          <a:fontRef idx="minor">
+            <a:schemeClr val="lt1"/>
+          </a:fontRef>
+        </p:style>
+        <p:txBody>
+          <a:bodyPr rtlCol="0" anchor="ctr"/>
+          <a:lstStyle/>
+          <a:p>
+            <a:pPr algn="ctr"/>
+            <a:r>
+              <a:rPr lang="es-ES" dirty="0" err="1" smtClean="0"/>
+              <a:t>Q.Component</a:t>
+            </a:r>
+            <a:endParaRPr lang="es-ES" dirty="0"/>
+          </a:p>
+        </p:txBody>
+      </p:sp>
+      <p:sp>
+        <p:nvSpPr>
+          <p:cNvPr id="7" name="6 Rectángulo"/>
+          <p:cNvSpPr/>
+          <p:nvPr/>
+        </p:nvSpPr>
+        <p:spPr>
+          <a:xfrm>
+            <a:off x="1259632" y="3284984"/>
+            <a:ext cx="1656184" cy="648072"/>
+          </a:xfrm>
+          <a:prstGeom prst="rect">
+            <a:avLst/>
+          </a:prstGeom>
+        </p:spPr>
+        <p:style>
+          <a:lnRef idx="2">
+            <a:schemeClr val="accent1">
+              <a:shade val="50000"/>
+            </a:schemeClr>
+          </a:lnRef>
+          <a:fillRef idx="1">
+            <a:schemeClr val="accent1"/>
+          </a:fillRef>
+          <a:effectRef idx="0">
+            <a:schemeClr val="accent1"/>
+          </a:effectRef>
+          <a:fontRef idx="minor">
+            <a:schemeClr val="lt1"/>
+          </a:fontRef>
+        </p:style>
+        <p:txBody>
+          <a:bodyPr rtlCol="0" anchor="ctr"/>
+          <a:lstStyle/>
+          <a:p>
+            <a:pPr algn="ctr"/>
+            <a:r>
+              <a:rPr lang="es-ES" dirty="0" err="1" smtClean="0"/>
+              <a:t>ZombiePlayer</a:t>
+            </a:r>
+            <a:endParaRPr lang="es-ES" dirty="0"/>
+          </a:p>
+        </p:txBody>
+      </p:sp>
+      <p:sp>
+        <p:nvSpPr>
+          <p:cNvPr id="8" name="7 Rectángulo"/>
+          <p:cNvSpPr/>
+          <p:nvPr/>
+        </p:nvSpPr>
+        <p:spPr>
+          <a:xfrm>
+            <a:off x="3851920" y="1124744"/>
+            <a:ext cx="1440160" cy="648072"/>
+          </a:xfrm>
+          <a:prstGeom prst="rect">
+            <a:avLst/>
+          </a:prstGeom>
+        </p:spPr>
+        <p:style>
+          <a:lnRef idx="2">
+            <a:schemeClr val="accent1">
+              <a:shade val="50000"/>
+            </a:schemeClr>
+          </a:lnRef>
+          <a:fillRef idx="1">
+            <a:schemeClr val="accent1"/>
+          </a:fillRef>
+          <a:effectRef idx="0">
+            <a:schemeClr val="accent1"/>
+          </a:effectRef>
+          <a:fontRef idx="minor">
+            <a:schemeClr val="lt1"/>
+          </a:fontRef>
+        </p:style>
+        <p:txBody>
+          <a:bodyPr rtlCol="0" anchor="ctr"/>
+          <a:lstStyle/>
+          <a:p>
+            <a:pPr algn="ctr"/>
+            <a:r>
+              <a:rPr lang="es-ES" dirty="0" err="1" smtClean="0"/>
+              <a:t>Q.Sprite</a:t>
+            </a:r>
+            <a:endParaRPr lang="es-ES" dirty="0"/>
+          </a:p>
+        </p:txBody>
+      </p:sp>
+      <p:sp>
+        <p:nvSpPr>
+          <p:cNvPr id="9" name="8 Rectángulo"/>
+          <p:cNvSpPr/>
+          <p:nvPr/>
+        </p:nvSpPr>
+        <p:spPr>
+          <a:xfrm>
+            <a:off x="5580112" y="3284984"/>
+            <a:ext cx="1440160" cy="648072"/>
+          </a:xfrm>
+          <a:prstGeom prst="rect">
+            <a:avLst/>
+          </a:prstGeom>
+        </p:spPr>
+        <p:style>
+          <a:lnRef idx="2">
+            <a:schemeClr val="accent1">
+              <a:shade val="50000"/>
+            </a:schemeClr>
+          </a:lnRef>
+          <a:fillRef idx="1">
+            <a:schemeClr val="accent1"/>
+          </a:fillRef>
+          <a:effectRef idx="0">
+            <a:schemeClr val="accent1"/>
+          </a:effectRef>
+          <a:fontRef idx="minor">
+            <a:schemeClr val="lt1"/>
+          </a:fontRef>
+        </p:style>
+        <p:txBody>
+          <a:bodyPr rtlCol="0" anchor="ctr"/>
+          <a:lstStyle/>
+          <a:p>
+            <a:pPr algn="ctr"/>
             <a:r>
               <a:rPr lang="es-ES" dirty="0" smtClean="0"/>
-              <a:t>, comportamiento de los enemigos,…</a:t>
-            </a:r>
-          </a:p>
-          <a:p>
-            <a:pPr algn="just"/>
+              <a:t>Box</a:t>
+            </a:r>
+            <a:endParaRPr lang="es-ES" dirty="0"/>
+          </a:p>
+        </p:txBody>
+      </p:sp>
+      <p:sp>
+        <p:nvSpPr>
+          <p:cNvPr id="27" name="26 Rectángulo"/>
+          <p:cNvSpPr/>
+          <p:nvPr/>
+        </p:nvSpPr>
+        <p:spPr>
+          <a:xfrm>
+            <a:off x="6660232" y="2420888"/>
+            <a:ext cx="1440160" cy="648072"/>
+          </a:xfrm>
+          <a:prstGeom prst="rect">
+            <a:avLst/>
+          </a:prstGeom>
+        </p:spPr>
+        <p:style>
+          <a:lnRef idx="2">
+            <a:schemeClr val="accent1">
+              <a:shade val="50000"/>
+            </a:schemeClr>
+          </a:lnRef>
+          <a:fillRef idx="1">
+            <a:schemeClr val="accent1"/>
+          </a:fillRef>
+          <a:effectRef idx="0">
+            <a:schemeClr val="accent1"/>
+          </a:effectRef>
+          <a:fontRef idx="minor">
+            <a:schemeClr val="lt1"/>
+          </a:fontRef>
+        </p:style>
+        <p:txBody>
+          <a:bodyPr rtlCol="0" anchor="ctr"/>
+          <a:lstStyle/>
+          <a:p>
+            <a:pPr algn="ctr"/>
+            <a:r>
+              <a:rPr lang="es-ES" dirty="0" err="1" smtClean="0"/>
+              <a:t>Enemy</a:t>
+            </a:r>
             <a:endParaRPr lang="es-ES" dirty="0" smtClean="0"/>
           </a:p>
-          <a:p>
-            <a:pPr algn="just"/>
-            <a:r>
-              <a:rPr lang="es-ES" dirty="0" smtClean="0"/>
-              <a:t>Lo que ha resultado más costoso: Mecánica de ocultamiento bajo tierra y mecánica de trepado de las cajas. Dificultad para desarrollar niveles complejos,…</a:t>
+        </p:txBody>
+      </p:sp>
+      <p:cxnSp>
+        <p:nvCxnSpPr>
+          <p:cNvPr id="38" name="37 Conector angular"/>
+          <p:cNvCxnSpPr>
+            <a:stCxn id="8" idx="2"/>
+            <a:endCxn id="27" idx="0"/>
+          </p:cNvCxnSpPr>
+          <p:nvPr/>
+        </p:nvCxnSpPr>
+        <p:spPr>
+          <a:xfrm rot="16200000" flipH="1">
+            <a:off x="5652120" y="692696"/>
+            <a:ext cx="648072" cy="2808312"/>
+          </a:xfrm>
+          <a:prstGeom prst="bentConnector3">
+            <a:avLst>
+              <a:gd name="adj1" fmla="val 50000"/>
+            </a:avLst>
+          </a:prstGeom>
+        </p:spPr>
+        <p:style>
+          <a:lnRef idx="1">
+            <a:schemeClr val="accent1"/>
+          </a:lnRef>
+          <a:fillRef idx="0">
+            <a:schemeClr val="accent1"/>
+          </a:fillRef>
+          <a:effectRef idx="0">
+            <a:schemeClr val="accent1"/>
+          </a:effectRef>
+          <a:fontRef idx="minor">
+            <a:schemeClr val="tx1"/>
+          </a:fontRef>
+        </p:style>
+      </p:cxnSp>
+      <p:cxnSp>
+        <p:nvCxnSpPr>
+          <p:cNvPr id="40" name="39 Conector angular"/>
+          <p:cNvCxnSpPr>
+            <a:stCxn id="8" idx="2"/>
+            <a:endCxn id="7" idx="0"/>
+          </p:cNvCxnSpPr>
+          <p:nvPr/>
+        </p:nvCxnSpPr>
+        <p:spPr>
+          <a:xfrm rot="5400000">
+            <a:off x="2573778" y="1286762"/>
+            <a:ext cx="1512168" cy="2484276"/>
+          </a:xfrm>
+          <a:prstGeom prst="bentConnector3">
+            <a:avLst>
+              <a:gd name="adj1" fmla="val 21161"/>
+            </a:avLst>
+          </a:prstGeom>
+        </p:spPr>
+        <p:style>
+          <a:lnRef idx="1">
+            <a:schemeClr val="accent1"/>
+          </a:lnRef>
+          <a:fillRef idx="0">
+            <a:schemeClr val="accent1"/>
+          </a:fillRef>
+          <a:effectRef idx="0">
+            <a:schemeClr val="accent1"/>
+          </a:effectRef>
+          <a:fontRef idx="minor">
+            <a:schemeClr val="tx1"/>
+          </a:fontRef>
+        </p:style>
+      </p:cxnSp>
+      <p:sp>
+        <p:nvSpPr>
+          <p:cNvPr id="45" name="44 Rectángulo"/>
+          <p:cNvSpPr/>
+          <p:nvPr/>
+        </p:nvSpPr>
+        <p:spPr>
+          <a:xfrm>
+            <a:off x="4499992" y="2420888"/>
+            <a:ext cx="1440160" cy="648072"/>
+          </a:xfrm>
+          <a:prstGeom prst="rect">
+            <a:avLst/>
+          </a:prstGeom>
+        </p:spPr>
+        <p:style>
+          <a:lnRef idx="2">
+            <a:schemeClr val="accent1">
+              <a:shade val="50000"/>
+            </a:schemeClr>
+          </a:lnRef>
+          <a:fillRef idx="1">
+            <a:schemeClr val="accent1"/>
+          </a:fillRef>
+          <a:effectRef idx="0">
+            <a:schemeClr val="accent1"/>
+          </a:effectRef>
+          <a:fontRef idx="minor">
+            <a:schemeClr val="lt1"/>
+          </a:fontRef>
+        </p:style>
+        <p:txBody>
+          <a:bodyPr rtlCol="0" anchor="ctr"/>
+          <a:lstStyle/>
+          <a:p>
+            <a:pPr algn="ctr"/>
+            <a:r>
+              <a:rPr lang="es-ES" dirty="0" err="1" smtClean="0"/>
+              <a:t>Bullet</a:t>
             </a:r>
             <a:endParaRPr lang="es-ES" dirty="0"/>
           </a:p>
         </p:txBody>
       </p:sp>
-      <p:sp>
-        <p:nvSpPr>
-          <p:cNvPr id="3" name="2 Título"/>
-          <p:cNvSpPr>
-            <a:spLocks noGrp="1"/>
-          </p:cNvSpPr>
-          <p:nvPr>
-            <p:ph type="title"/>
-          </p:nvPr>
-        </p:nvSpPr>
-        <p:spPr/>
-        <p:txBody>
-          <a:bodyPr/>
+      <p:cxnSp>
+        <p:nvCxnSpPr>
+          <p:cNvPr id="51" name="50 Conector angular"/>
+          <p:cNvCxnSpPr>
+            <a:stCxn id="8" idx="2"/>
+            <a:endCxn id="5" idx="0"/>
+          </p:cNvCxnSpPr>
+          <p:nvPr/>
+        </p:nvCxnSpPr>
+        <p:spPr>
+          <a:xfrm rot="5400000">
+            <a:off x="3545886" y="2258870"/>
+            <a:ext cx="1512168" cy="540060"/>
+          </a:xfrm>
+          <a:prstGeom prst="bentConnector3">
+            <a:avLst>
+              <a:gd name="adj1" fmla="val 21161"/>
+            </a:avLst>
+          </a:prstGeom>
+        </p:spPr>
+        <p:style>
+          <a:lnRef idx="1">
+            <a:schemeClr val="accent1"/>
+          </a:lnRef>
+          <a:fillRef idx="0">
+            <a:schemeClr val="accent1"/>
+          </a:fillRef>
+          <a:effectRef idx="0">
+            <a:schemeClr val="accent1"/>
+          </a:effectRef>
+          <a:fontRef idx="minor">
+            <a:schemeClr val="tx1"/>
+          </a:fontRef>
+        </p:style>
+      </p:cxnSp>
+      <p:cxnSp>
+        <p:nvCxnSpPr>
+          <p:cNvPr id="55" name="54 Conector angular"/>
+          <p:cNvCxnSpPr>
+            <a:stCxn id="8" idx="2"/>
+            <a:endCxn id="9" idx="0"/>
+          </p:cNvCxnSpPr>
+          <p:nvPr/>
+        </p:nvCxnSpPr>
+        <p:spPr>
+          <a:xfrm rot="16200000" flipH="1">
+            <a:off x="4680012" y="1664804"/>
+            <a:ext cx="1512168" cy="1728192"/>
+          </a:xfrm>
+          <a:prstGeom prst="bentConnector3">
+            <a:avLst>
+              <a:gd name="adj1" fmla="val 21160"/>
+            </a:avLst>
+          </a:prstGeom>
+        </p:spPr>
+        <p:style>
+          <a:lnRef idx="1">
+            <a:schemeClr val="accent1"/>
+          </a:lnRef>
+          <a:fillRef idx="0">
+            <a:schemeClr val="accent1"/>
+          </a:fillRef>
+          <a:effectRef idx="0">
+            <a:schemeClr val="accent1"/>
+          </a:effectRef>
+          <a:fontRef idx="minor">
+            <a:schemeClr val="tx1"/>
+          </a:fontRef>
+        </p:style>
+      </p:cxnSp>
+      <p:cxnSp>
+        <p:nvCxnSpPr>
+          <p:cNvPr id="64" name="63 Conector angular"/>
+          <p:cNvCxnSpPr>
+            <a:stCxn id="8" idx="2"/>
+            <a:endCxn id="45" idx="0"/>
+          </p:cNvCxnSpPr>
+          <p:nvPr/>
+        </p:nvCxnSpPr>
+        <p:spPr>
+          <a:xfrm rot="16200000" flipH="1">
+            <a:off x="4572000" y="1772816"/>
+            <a:ext cx="648072" cy="648072"/>
+          </a:xfrm>
+          <a:prstGeom prst="bentConnector3">
+            <a:avLst>
+              <a:gd name="adj1" fmla="val 50000"/>
+            </a:avLst>
+          </a:prstGeom>
+        </p:spPr>
+        <p:style>
+          <a:lnRef idx="1">
+            <a:schemeClr val="accent1"/>
+          </a:lnRef>
+          <a:fillRef idx="0">
+            <a:schemeClr val="accent1"/>
+          </a:fillRef>
+          <a:effectRef idx="0">
+            <a:schemeClr val="accent1"/>
+          </a:effectRef>
+          <a:fontRef idx="minor">
+            <a:schemeClr val="tx1"/>
+          </a:fontRef>
+        </p:style>
+      </p:cxnSp>
+      <p:cxnSp>
+        <p:nvCxnSpPr>
+          <p:cNvPr id="66" name="65 Conector angular"/>
+          <p:cNvCxnSpPr>
+            <a:stCxn id="8" idx="2"/>
+            <a:endCxn id="4" idx="0"/>
+          </p:cNvCxnSpPr>
+          <p:nvPr/>
+        </p:nvCxnSpPr>
+        <p:spPr>
+          <a:xfrm rot="5400000">
+            <a:off x="3491880" y="1340768"/>
+            <a:ext cx="648072" cy="1512168"/>
+          </a:xfrm>
+          <a:prstGeom prst="bentConnector3">
+            <a:avLst>
+              <a:gd name="adj1" fmla="val 50000"/>
+            </a:avLst>
+          </a:prstGeom>
+        </p:spPr>
+        <p:style>
+          <a:lnRef idx="1">
+            <a:schemeClr val="accent1"/>
+          </a:lnRef>
+          <a:fillRef idx="0">
+            <a:schemeClr val="accent1"/>
+          </a:fillRef>
+          <a:effectRef idx="0">
+            <a:schemeClr val="accent1"/>
+          </a:effectRef>
+          <a:fontRef idx="minor">
+            <a:schemeClr val="tx1"/>
+          </a:fontRef>
+        </p:style>
+      </p:cxnSp>
+      <p:sp>
+        <p:nvSpPr>
+          <p:cNvPr id="72" name="71 Rectángulo"/>
+          <p:cNvSpPr/>
+          <p:nvPr/>
+        </p:nvSpPr>
+        <p:spPr>
+          <a:xfrm>
+            <a:off x="2195736" y="5373216"/>
+            <a:ext cx="2232248" cy="648072"/>
+          </a:xfrm>
+          <a:prstGeom prst="rect">
+            <a:avLst/>
+          </a:prstGeom>
+        </p:spPr>
+        <p:style>
+          <a:lnRef idx="2">
+            <a:schemeClr val="accent1">
+              <a:shade val="50000"/>
+            </a:schemeClr>
+          </a:lnRef>
+          <a:fillRef idx="1">
+            <a:schemeClr val="accent1"/>
+          </a:fillRef>
+          <a:effectRef idx="0">
+            <a:schemeClr val="accent1"/>
+          </a:effectRef>
+          <a:fontRef idx="minor">
+            <a:schemeClr val="lt1"/>
+          </a:fontRef>
+        </p:style>
+        <p:txBody>
+          <a:bodyPr rtlCol="0" anchor="ctr"/>
           <a:lstStyle/>
           <a:p>
             <a:pPr algn="ctr"/>
             <a:r>
               <a:rPr lang="es-ES" dirty="0" err="1" smtClean="0"/>
-              <a:t>Postmortem</a:t>
+              <a:t>controlesBajoTierra</a:t>
             </a:r>
             <a:endParaRPr lang="es-ES" dirty="0"/>
           </a:p>
         </p:txBody>
       </p:sp>
+      <p:sp>
+        <p:nvSpPr>
+          <p:cNvPr id="73" name="72 Rectángulo"/>
+          <p:cNvSpPr/>
+          <p:nvPr/>
+        </p:nvSpPr>
+        <p:spPr>
+          <a:xfrm>
+            <a:off x="4788024" y="5373216"/>
+            <a:ext cx="3024336" cy="648072"/>
+          </a:xfrm>
+          <a:prstGeom prst="rect">
+            <a:avLst/>
+          </a:prstGeom>
+        </p:spPr>
+        <p:style>
+          <a:lnRef idx="2">
+            <a:schemeClr val="accent1">
+              <a:shade val="50000"/>
+            </a:schemeClr>
+          </a:lnRef>
+          <a:fillRef idx="1">
+            <a:schemeClr val="accent1"/>
+          </a:fillRef>
+          <a:effectRef idx="0">
+            <a:schemeClr val="accent1"/>
+          </a:effectRef>
+          <a:fontRef idx="minor">
+            <a:schemeClr val="lt1"/>
+          </a:fontRef>
+        </p:style>
+        <p:txBody>
+          <a:bodyPr rtlCol="0" anchor="ctr"/>
+          <a:lstStyle/>
+          <a:p>
+            <a:pPr algn="ctr"/>
+            <a:r>
+              <a:rPr lang="es-ES" dirty="0" err="1" smtClean="0"/>
+              <a:t>comportamientoEnemigo</a:t>
+            </a:r>
+            <a:endParaRPr lang="es-ES" dirty="0"/>
+          </a:p>
+        </p:txBody>
+      </p:sp>
+      <p:cxnSp>
+        <p:nvCxnSpPr>
+          <p:cNvPr id="75" name="74 Conector angular"/>
+          <p:cNvCxnSpPr>
+            <a:stCxn id="6" idx="2"/>
+            <a:endCxn id="72" idx="0"/>
+          </p:cNvCxnSpPr>
+          <p:nvPr/>
+        </p:nvCxnSpPr>
+        <p:spPr>
+          <a:xfrm rot="5400000">
+            <a:off x="3797914" y="4383106"/>
+            <a:ext cx="504056" cy="1476164"/>
+          </a:xfrm>
+          <a:prstGeom prst="bentConnector3">
+            <a:avLst>
+              <a:gd name="adj1" fmla="val 50000"/>
+            </a:avLst>
+          </a:prstGeom>
+        </p:spPr>
+        <p:style>
+          <a:lnRef idx="1">
+            <a:schemeClr val="accent1"/>
+          </a:lnRef>
+          <a:fillRef idx="0">
+            <a:schemeClr val="accent1"/>
+          </a:fillRef>
+          <a:effectRef idx="0">
+            <a:schemeClr val="accent1"/>
+          </a:effectRef>
+          <a:fontRef idx="minor">
+            <a:schemeClr val="tx1"/>
+          </a:fontRef>
+        </p:style>
+      </p:cxnSp>
+      <p:cxnSp>
+        <p:nvCxnSpPr>
+          <p:cNvPr id="77" name="76 Conector angular"/>
+          <p:cNvCxnSpPr>
+            <a:stCxn id="6" idx="2"/>
+            <a:endCxn id="73" idx="0"/>
+          </p:cNvCxnSpPr>
+          <p:nvPr/>
+        </p:nvCxnSpPr>
+        <p:spPr>
+          <a:xfrm rot="16200000" flipH="1">
+            <a:off x="5292080" y="4365104"/>
+            <a:ext cx="504056" cy="1512168"/>
+          </a:xfrm>
+          <a:prstGeom prst="bentConnector3">
+            <a:avLst>
+              <a:gd name="adj1" fmla="val 50000"/>
+            </a:avLst>
+          </a:prstGeom>
+        </p:spPr>
+        <p:style>
+          <a:lnRef idx="1">
+            <a:schemeClr val="accent1"/>
+          </a:lnRef>
+          <a:fillRef idx="0">
+            <a:schemeClr val="accent1"/>
+          </a:fillRef>
+          <a:effectRef idx="0">
+            <a:schemeClr val="accent1"/>
+          </a:effectRef>
+          <a:fontRef idx="minor">
+            <a:schemeClr val="tx1"/>
+          </a:fontRef>
+        </p:style>
+      </p:cxnSp>
     </p:spTree>
   </p:cSld>
   <p:clrMapOvr>
@@ -4722,6 +5410,110 @@
 </file>
 
 <file path=ppt/slides/slide8.xml><?xml version="1.0" encoding="utf-8"?>
+<p:sld xmlns:a="http://schemas.openxmlformats.org/drawingml/2006/main" xmlns:r="http://schemas.openxmlformats.org/officeDocument/2006/relationships" xmlns:p="http://schemas.openxmlformats.org/presentationml/2006/main">
+  <p:cSld>
+    <p:spTree>
+      <p:nvGrpSpPr>
+        <p:cNvPr id="1" name=""/>
+        <p:cNvGrpSpPr/>
+        <p:nvPr/>
+      </p:nvGrpSpPr>
+      <p:grpSpPr>
+        <a:xfrm>
+          <a:off x="0" y="0"/>
+          <a:ext cx="0" cy="0"/>
+          <a:chOff x="0" y="0"/>
+          <a:chExt cx="0" cy="0"/>
+        </a:xfrm>
+      </p:grpSpPr>
+      <p:sp>
+        <p:nvSpPr>
+          <p:cNvPr id="2" name="1 Marcador de contenido"/>
+          <p:cNvSpPr>
+            <a:spLocks noGrp="1"/>
+          </p:cNvSpPr>
+          <p:nvPr>
+            <p:ph idx="1"/>
+          </p:nvPr>
+        </p:nvSpPr>
+        <p:spPr>
+          <a:xfrm>
+            <a:off x="467544" y="1772816"/>
+            <a:ext cx="8229600" cy="4572000"/>
+          </a:xfrm>
+        </p:spPr>
+        <p:txBody>
+          <a:bodyPr/>
+          <a:lstStyle/>
+          <a:p>
+            <a:pPr algn="just"/>
+            <a:r>
+              <a:rPr lang="es-ES" dirty="0" smtClean="0"/>
+              <a:t>Lo que ha ido bien: Organización de los archivos de nuestro juego, implementación de algunas mecánicas, la creación de escenas del juego, el HUD, </a:t>
+            </a:r>
+            <a:r>
+              <a:rPr lang="es-ES" dirty="0" err="1" smtClean="0"/>
+              <a:t>sprites</a:t>
+            </a:r>
+            <a:r>
+              <a:rPr lang="es-ES" dirty="0" smtClean="0"/>
+              <a:t>, comportamiento de los enemigos,…</a:t>
+            </a:r>
+          </a:p>
+          <a:p>
+            <a:pPr algn="just"/>
+            <a:endParaRPr lang="es-ES" dirty="0" smtClean="0"/>
+          </a:p>
+          <a:p>
+            <a:pPr algn="just"/>
+            <a:r>
+              <a:rPr lang="es-ES" dirty="0" smtClean="0"/>
+              <a:t>Lo que ha resultado más costoso: Mecánica de ocultamiento bajo tierra y mecánica de trepado de las cajas. Dificultad para desarrollar niveles complejos,…</a:t>
+            </a:r>
+            <a:endParaRPr lang="es-ES" dirty="0"/>
+          </a:p>
+        </p:txBody>
+      </p:sp>
+      <p:sp>
+        <p:nvSpPr>
+          <p:cNvPr id="3" name="2 Título"/>
+          <p:cNvSpPr>
+            <a:spLocks noGrp="1"/>
+          </p:cNvSpPr>
+          <p:nvPr>
+            <p:ph type="title"/>
+          </p:nvPr>
+        </p:nvSpPr>
+        <p:spPr/>
+        <p:txBody>
+          <a:bodyPr/>
+          <a:lstStyle/>
+          <a:p>
+            <a:pPr algn="ctr"/>
+            <a:r>
+              <a:rPr lang="es-ES" dirty="0" err="1" smtClean="0"/>
+              <a:t>Postmortem</a:t>
+            </a:r>
+            <a:endParaRPr lang="es-ES" dirty="0"/>
+          </a:p>
+        </p:txBody>
+      </p:sp>
+    </p:spTree>
+  </p:cSld>
+  <p:clrMapOvr>
+    <a:masterClrMapping/>
+  </p:clrMapOvr>
+  <p:timing>
+    <p:tnLst>
+      <p:par>
+        <p:cTn id="1" dur="indefinite" restart="never" nodeType="tmRoot"/>
+      </p:par>
+    </p:tnLst>
+  </p:timing>
+</p:sld>
+</file>
+
+<file path=ppt/slides/slide9.xml><?xml version="1.0" encoding="utf-8"?>
 <p:sld xmlns:a="http://schemas.openxmlformats.org/drawingml/2006/main" xmlns:r="http://schemas.openxmlformats.org/officeDocument/2006/relationships" xmlns:p="http://schemas.openxmlformats.org/presentationml/2006/main">
   <p:cSld>
     <p:spTree>

</xml_diff>